<commit_message>
ex1 done, start on ex2
</commit_message>
<xml_diff>
--- a/Rabbitmq lecture.pptx
+++ b/Rabbitmq lecture.pptx
@@ -5,7 +5,7 @@
     <p:sldMasterId id="2147483702" r:id="rId1"/>
   </p:sldMasterIdLst>
   <p:notesMasterIdLst>
-    <p:notesMasterId r:id="rId43"/>
+    <p:notesMasterId r:id="rId42"/>
   </p:notesMasterIdLst>
   <p:sldIdLst>
     <p:sldId id="256" r:id="rId2"/>
@@ -47,8 +47,7 @@
     <p:sldId id="266" r:id="rId38"/>
     <p:sldId id="285" r:id="rId39"/>
     <p:sldId id="267" r:id="rId40"/>
-    <p:sldId id="268" r:id="rId41"/>
-    <p:sldId id="272" r:id="rId42"/>
+    <p:sldId id="272" r:id="rId41"/>
   </p:sldIdLst>
   <p:sldSz cx="12192000" cy="6858000"/>
   <p:notesSz cx="6858000" cy="9144000"/>
@@ -237,7 +236,7 @@
           <a:p>
             <a:fld id="{8B0400A7-9789-452B-BC01-AD390C398DAD}" type="datetimeFigureOut">
               <a:rPr lang="en-US" smtClean="0"/>
-              <a:t>2/5/2019</a:t>
+              <a:t>2/6/2019</a:t>
             </a:fld>
             <a:endParaRPr lang="en-US"/>
           </a:p>
@@ -2084,6 +2083,90 @@
 </p:notes>
 </file>
 
+<file path=ppt/notesSlides/notesSlide22.xml><?xml version="1.0" encoding="utf-8"?>
+<p:notes xmlns:a="http://schemas.openxmlformats.org/drawingml/2006/main" xmlns:r="http://schemas.openxmlformats.org/officeDocument/2006/relationships" xmlns:p="http://schemas.openxmlformats.org/presentationml/2006/main">
+  <p:cSld>
+    <p:spTree>
+      <p:nvGrpSpPr>
+        <p:cNvPr id="1" name=""/>
+        <p:cNvGrpSpPr/>
+        <p:nvPr/>
+      </p:nvGrpSpPr>
+      <p:grpSpPr>
+        <a:xfrm>
+          <a:off x="0" y="0"/>
+          <a:ext cx="0" cy="0"/>
+          <a:chOff x="0" y="0"/>
+          <a:chExt cx="0" cy="0"/>
+        </a:xfrm>
+      </p:grpSpPr>
+      <p:sp>
+        <p:nvSpPr>
+          <p:cNvPr id="2" name="Slide Image Placeholder 1"/>
+          <p:cNvSpPr>
+            <a:spLocks noGrp="1" noRot="1" noChangeAspect="1"/>
+          </p:cNvSpPr>
+          <p:nvPr>
+            <p:ph type="sldImg"/>
+          </p:nvPr>
+        </p:nvSpPr>
+        <p:spPr/>
+      </p:sp>
+      <p:sp>
+        <p:nvSpPr>
+          <p:cNvPr id="3" name="Notes Placeholder 2"/>
+          <p:cNvSpPr>
+            <a:spLocks noGrp="1"/>
+          </p:cNvSpPr>
+          <p:nvPr>
+            <p:ph type="body" idx="1"/>
+          </p:nvPr>
+        </p:nvSpPr>
+        <p:spPr/>
+        <p:txBody>
+          <a:bodyPr/>
+          <a:lstStyle/>
+          <a:p>
+            <a:endParaRPr lang="en-US" dirty="0"/>
+          </a:p>
+        </p:txBody>
+      </p:sp>
+      <p:sp>
+        <p:nvSpPr>
+          <p:cNvPr id="4" name="Slide Number Placeholder 3"/>
+          <p:cNvSpPr>
+            <a:spLocks noGrp="1"/>
+          </p:cNvSpPr>
+          <p:nvPr>
+            <p:ph type="sldNum" sz="quarter" idx="10"/>
+          </p:nvPr>
+        </p:nvSpPr>
+        <p:spPr/>
+        <p:txBody>
+          <a:bodyPr/>
+          <a:lstStyle/>
+          <a:p>
+            <a:fld id="{5206DCD0-0D67-4BF5-951B-363C0E1A0885}" type="slidenum">
+              <a:rPr lang="en-US" smtClean="0"/>
+              <a:t>38</a:t>
+            </a:fld>
+            <a:endParaRPr lang="en-US"/>
+          </a:p>
+        </p:txBody>
+      </p:sp>
+    </p:spTree>
+    <p:extLst>
+      <p:ext uri="{BB962C8B-B14F-4D97-AF65-F5344CB8AC3E}">
+        <p14:creationId xmlns:p14="http://schemas.microsoft.com/office/powerpoint/2010/main" val="4077857641"/>
+      </p:ext>
+    </p:extLst>
+  </p:cSld>
+  <p:clrMapOvr>
+    <a:masterClrMapping/>
+  </p:clrMapOvr>
+</p:notes>
+</file>
+
 <file path=ppt/notesSlides/notesSlide3.xml><?xml version="1.0" encoding="utf-8"?>
 <p:notes xmlns:a="http://schemas.openxmlformats.org/drawingml/2006/main" xmlns:r="http://schemas.openxmlformats.org/officeDocument/2006/relationships" xmlns:p="http://schemas.openxmlformats.org/presentationml/2006/main">
   <p:cSld>
@@ -3069,7 +3152,7 @@
           <a:p>
             <a:fld id="{E170E938-8157-4FE8-A5D6-416C20B9A92B}" type="datetimeFigureOut">
               <a:rPr lang="en-US" smtClean="0"/>
-              <a:t>2/5/2019</a:t>
+              <a:t>2/6/2019</a:t>
             </a:fld>
             <a:endParaRPr lang="en-US"/>
           </a:p>
@@ -3344,7 +3427,7 @@
           <a:p>
             <a:fld id="{E170E938-8157-4FE8-A5D6-416C20B9A92B}" type="datetimeFigureOut">
               <a:rPr lang="en-US" smtClean="0"/>
-              <a:t>2/5/2019</a:t>
+              <a:t>2/6/2019</a:t>
             </a:fld>
             <a:endParaRPr lang="en-US"/>
           </a:p>
@@ -3538,7 +3621,7 @@
           <a:p>
             <a:fld id="{E170E938-8157-4FE8-A5D6-416C20B9A92B}" type="datetimeFigureOut">
               <a:rPr lang="en-US" smtClean="0"/>
-              <a:t>2/5/2019</a:t>
+              <a:t>2/6/2019</a:t>
             </a:fld>
             <a:endParaRPr lang="en-US"/>
           </a:p>
@@ -3809,7 +3892,7 @@
           <a:p>
             <a:fld id="{E170E938-8157-4FE8-A5D6-416C20B9A92B}" type="datetimeFigureOut">
               <a:rPr lang="en-US" smtClean="0"/>
-              <a:t>2/5/2019</a:t>
+              <a:t>2/6/2019</a:t>
             </a:fld>
             <a:endParaRPr lang="en-US"/>
           </a:p>
@@ -4136,7 +4219,7 @@
           <a:p>
             <a:fld id="{E170E938-8157-4FE8-A5D6-416C20B9A92B}" type="datetimeFigureOut">
               <a:rPr lang="en-US" smtClean="0"/>
-              <a:t>2/5/2019</a:t>
+              <a:t>2/6/2019</a:t>
             </a:fld>
             <a:endParaRPr lang="en-US"/>
           </a:p>
@@ -4755,7 +4838,7 @@
           <a:p>
             <a:fld id="{E170E938-8157-4FE8-A5D6-416C20B9A92B}" type="datetimeFigureOut">
               <a:rPr lang="en-US" smtClean="0"/>
-              <a:t>2/5/2019</a:t>
+              <a:t>2/6/2019</a:t>
             </a:fld>
             <a:endParaRPr lang="en-US"/>
           </a:p>
@@ -5602,7 +5685,7 @@
           <a:p>
             <a:fld id="{E170E938-8157-4FE8-A5D6-416C20B9A92B}" type="datetimeFigureOut">
               <a:rPr lang="en-US" smtClean="0"/>
-              <a:t>2/5/2019</a:t>
+              <a:t>2/6/2019</a:t>
             </a:fld>
             <a:endParaRPr lang="en-US"/>
           </a:p>
@@ -5772,7 +5855,7 @@
           <a:p>
             <a:fld id="{E170E938-8157-4FE8-A5D6-416C20B9A92B}" type="datetimeFigureOut">
               <a:rPr lang="en-US" smtClean="0"/>
-              <a:t>2/5/2019</a:t>
+              <a:t>2/6/2019</a:t>
             </a:fld>
             <a:endParaRPr lang="en-US"/>
           </a:p>
@@ -5952,7 +6035,7 @@
           <a:p>
             <a:fld id="{E170E938-8157-4FE8-A5D6-416C20B9A92B}" type="datetimeFigureOut">
               <a:rPr lang="en-US" smtClean="0"/>
-              <a:t>2/5/2019</a:t>
+              <a:t>2/6/2019</a:t>
             </a:fld>
             <a:endParaRPr lang="en-US"/>
           </a:p>
@@ -6122,7 +6205,7 @@
           <a:p>
             <a:fld id="{E170E938-8157-4FE8-A5D6-416C20B9A92B}" type="datetimeFigureOut">
               <a:rPr lang="en-US" smtClean="0"/>
-              <a:t>2/5/2019</a:t>
+              <a:t>2/6/2019</a:t>
             </a:fld>
             <a:endParaRPr lang="en-US"/>
           </a:p>
@@ -6369,7 +6452,7 @@
           <a:p>
             <a:fld id="{E170E938-8157-4FE8-A5D6-416C20B9A92B}" type="datetimeFigureOut">
               <a:rPr lang="en-US" smtClean="0"/>
-              <a:t>2/5/2019</a:t>
+              <a:t>2/6/2019</a:t>
             </a:fld>
             <a:endParaRPr lang="en-US"/>
           </a:p>
@@ -6661,7 +6744,7 @@
           <a:p>
             <a:fld id="{E170E938-8157-4FE8-A5D6-416C20B9A92B}" type="datetimeFigureOut">
               <a:rPr lang="en-US" smtClean="0"/>
-              <a:t>2/5/2019</a:t>
+              <a:t>2/6/2019</a:t>
             </a:fld>
             <a:endParaRPr lang="en-US"/>
           </a:p>
@@ -7105,7 +7188,7 @@
           <a:p>
             <a:fld id="{E170E938-8157-4FE8-A5D6-416C20B9A92B}" type="datetimeFigureOut">
               <a:rPr lang="en-US" smtClean="0"/>
-              <a:t>2/5/2019</a:t>
+              <a:t>2/6/2019</a:t>
             </a:fld>
             <a:endParaRPr lang="en-US"/>
           </a:p>
@@ -7223,7 +7306,7 @@
           <a:p>
             <a:fld id="{E170E938-8157-4FE8-A5D6-416C20B9A92B}" type="datetimeFigureOut">
               <a:rPr lang="en-US" smtClean="0"/>
-              <a:t>2/5/2019</a:t>
+              <a:t>2/6/2019</a:t>
             </a:fld>
             <a:endParaRPr lang="en-US"/>
           </a:p>
@@ -7318,7 +7401,7 @@
           <a:p>
             <a:fld id="{E170E938-8157-4FE8-A5D6-416C20B9A92B}" type="datetimeFigureOut">
               <a:rPr lang="en-US" smtClean="0"/>
-              <a:t>2/5/2019</a:t>
+              <a:t>2/6/2019</a:t>
             </a:fld>
             <a:endParaRPr lang="en-US"/>
           </a:p>
@@ -7597,7 +7680,7 @@
           <a:p>
             <a:fld id="{E170E938-8157-4FE8-A5D6-416C20B9A92B}" type="datetimeFigureOut">
               <a:rPr lang="en-US" smtClean="0"/>
-              <a:t>2/5/2019</a:t>
+              <a:t>2/6/2019</a:t>
             </a:fld>
             <a:endParaRPr lang="en-US"/>
           </a:p>
@@ -7872,7 +7955,7 @@
           <a:p>
             <a:fld id="{E170E938-8157-4FE8-A5D6-416C20B9A92B}" type="datetimeFigureOut">
               <a:rPr lang="en-US" smtClean="0"/>
-              <a:t>2/5/2019</a:t>
+              <a:t>2/6/2019</a:t>
             </a:fld>
             <a:endParaRPr lang="en-US"/>
           </a:p>
@@ -8295,7 +8378,7 @@
           <a:p>
             <a:fld id="{E170E938-8157-4FE8-A5D6-416C20B9A92B}" type="datetimeFigureOut">
               <a:rPr lang="en-US" smtClean="0"/>
-              <a:t>2/5/2019</a:t>
+              <a:t>2/6/2019</a:t>
             </a:fld>
             <a:endParaRPr lang="en-US"/>
           </a:p>
@@ -10857,11 +10940,7 @@
             <a:pPr lvl="4"/>
             <a:r>
               <a:rPr lang="en-US" sz="1800" dirty="0" smtClean="0"/>
-              <a:t>General overview, some things </a:t>
-            </a:r>
-            <a:r>
-              <a:rPr lang="en-US" sz="1800" dirty="0" smtClean="0"/>
-              <a:t>are skimmed</a:t>
+              <a:t>General overview, some things are skimmed</a:t>
             </a:r>
             <a:endParaRPr lang="en-US" sz="1800" dirty="0"/>
           </a:p>
@@ -11822,19 +11901,7 @@
             </a:pPr>
             <a:r>
               <a:rPr lang="en-US" sz="1600" dirty="0" smtClean="0"/>
-              <a:t>*May be limitation of </a:t>
-            </a:r>
-            <a:r>
-              <a:rPr lang="en-US" sz="1600" dirty="0" smtClean="0"/>
-              <a:t>AMPQ protocol, </a:t>
-            </a:r>
-            <a:r>
-              <a:rPr lang="en-US" sz="1600" dirty="0" smtClean="0"/>
-              <a:t>not </a:t>
-            </a:r>
-            <a:r>
-              <a:rPr lang="en-US" sz="1600" dirty="0" smtClean="0"/>
-              <a:t>necessarily </a:t>
+              <a:t>*May be limitation of AMPQ protocol, not necessarily </a:t>
             </a:r>
             <a:r>
               <a:rPr lang="en-US" sz="1600" dirty="0" err="1" smtClean="0"/>
@@ -11844,7 +11911,6 @@
               <a:rPr lang="en-US" sz="1600" dirty="0" smtClean="0"/>
               <a:t> </a:t>
             </a:r>
-            <a:endParaRPr lang="en-US" sz="1600" dirty="0" smtClean="0"/>
           </a:p>
           <a:p>
             <a:pPr lvl="1"/>
@@ -11971,7 +12037,6 @@
               <a:rPr lang="en-US" sz="2800" dirty="0" smtClean="0"/>
               <a:t>Pre-Queueing</a:t>
             </a:r>
-            <a:endParaRPr lang="en-US" sz="2800" dirty="0" smtClean="0"/>
           </a:p>
           <a:p>
             <a:pPr lvl="1"/>
@@ -12011,19 +12076,7 @@
             </a:pPr>
             <a:r>
               <a:rPr lang="en-US" sz="1600" dirty="0" smtClean="0"/>
-              <a:t>*May be limitation of </a:t>
-            </a:r>
-            <a:r>
-              <a:rPr lang="en-US" sz="1600" dirty="0" smtClean="0"/>
-              <a:t>AMPQ protocol, </a:t>
-            </a:r>
-            <a:r>
-              <a:rPr lang="en-US" sz="1600" dirty="0" smtClean="0"/>
-              <a:t>not </a:t>
-            </a:r>
-            <a:r>
-              <a:rPr lang="en-US" sz="1600" dirty="0" smtClean="0"/>
-              <a:t>necessarily </a:t>
+              <a:t>*May be limitation of AMPQ protocol, not necessarily </a:t>
             </a:r>
             <a:r>
               <a:rPr lang="en-US" sz="1600" dirty="0" err="1" smtClean="0"/>
@@ -12033,7 +12086,6 @@
               <a:rPr lang="en-US" sz="1600" dirty="0" smtClean="0"/>
               <a:t> </a:t>
             </a:r>
-            <a:endParaRPr lang="en-US" sz="1600" dirty="0" smtClean="0"/>
           </a:p>
           <a:p>
             <a:pPr lvl="1"/>
@@ -13483,9 +13535,16 @@
             <p:ph idx="1"/>
           </p:nvPr>
         </p:nvSpPr>
-        <p:spPr/>
-        <p:txBody>
-          <a:bodyPr/>
+        <p:spPr>
+          <a:xfrm>
+            <a:off x="1104293" y="1361802"/>
+            <a:ext cx="8946541" cy="5102793"/>
+          </a:xfrm>
+        </p:spPr>
+        <p:txBody>
+          <a:bodyPr>
+            <a:normAutofit/>
+          </a:bodyPr>
           <a:lstStyle/>
           <a:p>
             <a:r>
@@ -13548,33 +13607,67 @@
             <a:endParaRPr lang="en-US" dirty="0" smtClean="0"/>
           </a:p>
           <a:p>
+            <a:r>
+              <a:rPr lang="en-US" dirty="0" err="1" smtClean="0"/>
+              <a:t>NodeJS</a:t>
+            </a:r>
+            <a:endParaRPr lang="en-US" dirty="0" smtClean="0"/>
+          </a:p>
+          <a:p>
+            <a:pPr lvl="1"/>
+            <a:r>
+              <a:rPr lang="en-US" dirty="0" smtClean="0">
+                <a:hlinkClick r:id="rId5"/>
+              </a:rPr>
+              <a:t>https</a:t>
+            </a:r>
+            <a:r>
+              <a:rPr lang="en-US" dirty="0">
+                <a:hlinkClick r:id="rId5"/>
+              </a:rPr>
+              <a:t>://nodejs.org/en</a:t>
+            </a:r>
+            <a:r>
+              <a:rPr lang="en-US" dirty="0" smtClean="0">
+                <a:hlinkClick r:id="rId5"/>
+              </a:rPr>
+              <a:t>/</a:t>
+            </a:r>
+            <a:endParaRPr lang="en-US" dirty="0" smtClean="0"/>
+          </a:p>
+          <a:p>
+            <a:r>
+              <a:rPr lang="en-US" dirty="0" smtClean="0"/>
+              <a:t>Code</a:t>
+            </a:r>
+          </a:p>
+          <a:p>
+            <a:pPr lvl="1"/>
+            <a:r>
+              <a:rPr lang="en-US" dirty="0">
+                <a:hlinkClick r:id="rId6"/>
+              </a:rPr>
+              <a:t>https://</a:t>
+            </a:r>
+            <a:r>
+              <a:rPr lang="en-US" dirty="0" smtClean="0">
+                <a:hlinkClick r:id="rId6"/>
+              </a:rPr>
+              <a:t>github.com/ryaovan/rabbitmq-tutorial</a:t>
+            </a:r>
             <a:endParaRPr lang="en-US" dirty="0"/>
           </a:p>
           <a:p>
+            <a:endParaRPr lang="en-US" dirty="0" smtClean="0"/>
+          </a:p>
+          <a:p>
             <a:r>
               <a:rPr lang="en-US" dirty="0" smtClean="0"/>
-              <a:t>Docker-</a:t>
-            </a:r>
-            <a:r>
-              <a:rPr lang="en-US" dirty="0" err="1" smtClean="0"/>
-              <a:t>compose.yml</a:t>
-            </a:r>
-            <a:endParaRPr lang="en-US" dirty="0" smtClean="0"/>
-          </a:p>
-          <a:p>
-            <a:pPr lvl="1"/>
+              <a:t>5 </a:t>
+            </a:r>
             <a:r>
               <a:rPr lang="en-US" dirty="0" smtClean="0"/>
-              <a:t>Combined service</a:t>
-            </a:r>
-          </a:p>
-          <a:p>
-            <a:endParaRPr lang="en-US" dirty="0"/>
-          </a:p>
-          <a:p>
-            <a:r>
-              <a:rPr lang="en-US" dirty="0" smtClean="0"/>
-              <a:t>5 min break</a:t>
+              <a:t>min break</a:t>
             </a:r>
           </a:p>
         </p:txBody>
@@ -13649,10 +13742,15 @@
             <p:ph idx="1"/>
           </p:nvPr>
         </p:nvSpPr>
-        <p:spPr/>
+        <p:spPr>
+          <a:xfrm>
+            <a:off x="1104293" y="1553188"/>
+            <a:ext cx="8946541" cy="4195481"/>
+          </a:xfrm>
+        </p:spPr>
         <p:txBody>
           <a:bodyPr>
-            <a:normAutofit fontScale="92500" lnSpcReduction="20000"/>
+            <a:normAutofit fontScale="85000" lnSpcReduction="20000"/>
           </a:bodyPr>
           <a:lstStyle/>
           <a:p>
@@ -13684,9 +13782,16 @@
             <a:endParaRPr lang="en-US" dirty="0" smtClean="0"/>
           </a:p>
           <a:p>
+            <a:endParaRPr lang="en-US" sz="1900" dirty="0" smtClean="0"/>
+          </a:p>
+          <a:p>
             <a:r>
               <a:rPr lang="en-US" sz="1900" dirty="0" smtClean="0"/>
-              <a:t>Steps:</a:t>
+              <a:t>Steps</a:t>
+            </a:r>
+            <a:r>
+              <a:rPr lang="en-US" sz="1900" dirty="0" smtClean="0"/>
+              <a:t>:</a:t>
             </a:r>
           </a:p>
           <a:p>
@@ -13716,8 +13821,17 @@
             <a:pPr lvl="2"/>
             <a:r>
               <a:rPr lang="en-US" sz="1900" dirty="0" smtClean="0"/>
-              <a:t>Create Exchange</a:t>
-            </a:r>
+              <a:t>Create </a:t>
+            </a:r>
+            <a:r>
+              <a:rPr lang="en-US" sz="1900" dirty="0" smtClean="0"/>
+              <a:t>Direct </a:t>
+            </a:r>
+            <a:r>
+              <a:rPr lang="en-US" sz="1900" dirty="0" smtClean="0"/>
+              <a:t>Exchange</a:t>
+            </a:r>
+            <a:endParaRPr lang="en-US" sz="1900" dirty="0" smtClean="0"/>
           </a:p>
           <a:p>
             <a:pPr marL="457200" lvl="1" indent="0">
@@ -13728,7 +13842,7 @@
               <a:t>3. Create </a:t>
             </a:r>
             <a:r>
-              <a:rPr lang="en-US" sz="1900" dirty="0"/>
+              <a:rPr lang="en-US" sz="1900" dirty="0" smtClean="0"/>
               <a:t>Consumer </a:t>
             </a:r>
             <a:r>
@@ -13753,8 +13867,12 @@
           <a:p>
             <a:pPr lvl="2"/>
             <a:r>
-              <a:rPr lang="en-US" sz="1900" dirty="0" err="1" smtClean="0"/>
-              <a:t>cosume</a:t>
+              <a:rPr lang="en-US" sz="1900" dirty="0" smtClean="0"/>
+              <a:t>C</a:t>
+            </a:r>
+            <a:r>
+              <a:rPr lang="en-US" sz="1900" dirty="0" smtClean="0"/>
+              <a:t>onsume</a:t>
             </a:r>
             <a:endParaRPr lang="en-US" sz="1900" dirty="0"/>
           </a:p>
@@ -13845,25 +13963,30 @@
           </a:p>
         </p:txBody>
       </p:sp>
-      <p:sp>
-        <p:nvSpPr>
-          <p:cNvPr id="3" name="Content Placeholder 2"/>
-          <p:cNvSpPr>
-            <a:spLocks noGrp="1"/>
-          </p:cNvSpPr>
-          <p:nvPr>
-            <p:ph idx="1"/>
-          </p:nvPr>
-        </p:nvSpPr>
-        <p:spPr/>
-        <p:txBody>
-          <a:bodyPr/>
-          <a:lstStyle/>
-          <a:p>
-            <a:endParaRPr lang="en-US" dirty="0"/>
-          </a:p>
-        </p:txBody>
-      </p:sp>
+      <p:pic>
+        <p:nvPicPr>
+          <p:cNvPr id="4" name="Picture 3"/>
+          <p:cNvPicPr>
+            <a:picLocks noChangeAspect="1"/>
+          </p:cNvPicPr>
+          <p:nvPr/>
+        </p:nvPicPr>
+        <p:blipFill>
+          <a:blip r:embed="rId3"/>
+          <a:stretch>
+            <a:fillRect/>
+          </a:stretch>
+        </p:blipFill>
+        <p:spPr>
+          <a:xfrm>
+            <a:off x="1613673" y="1233379"/>
+            <a:ext cx="9213337" cy="5513378"/>
+          </a:xfrm>
+          <a:prstGeom prst="rect">
+            <a:avLst/>
+          </a:prstGeom>
+        </p:spPr>
+      </p:pic>
     </p:spTree>
     <p:extLst>
       <p:ext uri="{BB962C8B-B14F-4D97-AF65-F5344CB8AC3E}">
@@ -13926,20 +14049,358 @@
       </p:sp>
       <p:sp>
         <p:nvSpPr>
-          <p:cNvPr id="3" name="Content Placeholder 2"/>
-          <p:cNvSpPr>
-            <a:spLocks noGrp="1"/>
-          </p:cNvSpPr>
-          <p:nvPr>
-            <p:ph idx="1"/>
-          </p:nvPr>
-        </p:nvSpPr>
-        <p:spPr/>
-        <p:txBody>
-          <a:bodyPr/>
-          <a:lstStyle/>
-          <a:p>
-            <a:endParaRPr lang="en-US"/>
+          <p:cNvPr id="4" name="Content Placeholder 2"/>
+          <p:cNvSpPr txBox="1">
+            <a:spLocks/>
+          </p:cNvSpPr>
+          <p:nvPr/>
+        </p:nvSpPr>
+        <p:spPr>
+          <a:xfrm>
+            <a:off x="1104293" y="1553188"/>
+            <a:ext cx="8946541" cy="4195481"/>
+          </a:xfrm>
+          <a:prstGeom prst="rect">
+            <a:avLst/>
+          </a:prstGeom>
+        </p:spPr>
+        <p:txBody>
+          <a:bodyPr vert="horz" lIns="91440" tIns="45720" rIns="91440" bIns="45720" rtlCol="0">
+            <a:normAutofit fontScale="85000" lnSpcReduction="20000"/>
+          </a:bodyPr>
+          <a:lstStyle>
+            <a:lvl1pPr marL="342900" indent="-342900" algn="l" defTabSz="457200" rtl="0" eaLnBrk="1" latinLnBrk="0" hangingPunct="1">
+              <a:spcBef>
+                <a:spcPts val="1000"/>
+              </a:spcBef>
+              <a:spcAft>
+                <a:spcPts val="0"/>
+              </a:spcAft>
+              <a:buClr>
+                <a:schemeClr val="accent1">
+                  <a:lumMod val="60000"/>
+                  <a:lumOff val="40000"/>
+                </a:schemeClr>
+              </a:buClr>
+              <a:buSzPct val="80000"/>
+              <a:buFont typeface="Wingdings 3" charset="2"/>
+              <a:buChar char=""/>
+              <a:defRPr sz="2000" b="0" i="0" kern="1200">
+                <a:solidFill>
+                  <a:schemeClr val="tx1"/>
+                </a:solidFill>
+                <a:latin typeface="+mj-lt"/>
+                <a:ea typeface="+mj-ea"/>
+                <a:cs typeface="+mj-cs"/>
+              </a:defRPr>
+            </a:lvl1pPr>
+            <a:lvl2pPr marL="742950" indent="-285750" algn="l" defTabSz="457200" rtl="0" eaLnBrk="1" latinLnBrk="0" hangingPunct="1">
+              <a:spcBef>
+                <a:spcPts val="1000"/>
+              </a:spcBef>
+              <a:spcAft>
+                <a:spcPts val="0"/>
+              </a:spcAft>
+              <a:buClr>
+                <a:schemeClr val="accent1">
+                  <a:lumMod val="60000"/>
+                  <a:lumOff val="40000"/>
+                </a:schemeClr>
+              </a:buClr>
+              <a:buSzPct val="80000"/>
+              <a:buFont typeface="Wingdings 3" charset="2"/>
+              <a:buChar char=""/>
+              <a:defRPr sz="1800" b="0" i="0" kern="1200">
+                <a:solidFill>
+                  <a:schemeClr val="tx1"/>
+                </a:solidFill>
+                <a:latin typeface="+mj-lt"/>
+                <a:ea typeface="+mj-ea"/>
+                <a:cs typeface="+mj-cs"/>
+              </a:defRPr>
+            </a:lvl2pPr>
+            <a:lvl3pPr marL="1143000" indent="-228600" algn="l" defTabSz="457200" rtl="0" eaLnBrk="1" latinLnBrk="0" hangingPunct="1">
+              <a:spcBef>
+                <a:spcPts val="1000"/>
+              </a:spcBef>
+              <a:spcAft>
+                <a:spcPts val="0"/>
+              </a:spcAft>
+              <a:buClr>
+                <a:schemeClr val="accent1">
+                  <a:lumMod val="60000"/>
+                  <a:lumOff val="40000"/>
+                </a:schemeClr>
+              </a:buClr>
+              <a:buSzPct val="80000"/>
+              <a:buFont typeface="Wingdings 3" charset="2"/>
+              <a:buChar char=""/>
+              <a:defRPr sz="1600" b="0" i="0" kern="1200">
+                <a:solidFill>
+                  <a:schemeClr val="tx1"/>
+                </a:solidFill>
+                <a:latin typeface="+mj-lt"/>
+                <a:ea typeface="+mj-ea"/>
+                <a:cs typeface="+mj-cs"/>
+              </a:defRPr>
+            </a:lvl3pPr>
+            <a:lvl4pPr marL="1600200" indent="-228600" algn="l" defTabSz="457200" rtl="0" eaLnBrk="1" latinLnBrk="0" hangingPunct="1">
+              <a:spcBef>
+                <a:spcPts val="1000"/>
+              </a:spcBef>
+              <a:spcAft>
+                <a:spcPts val="0"/>
+              </a:spcAft>
+              <a:buClr>
+                <a:schemeClr val="accent1">
+                  <a:lumMod val="60000"/>
+                  <a:lumOff val="40000"/>
+                </a:schemeClr>
+              </a:buClr>
+              <a:buSzPct val="80000"/>
+              <a:buFont typeface="Wingdings 3" charset="2"/>
+              <a:buChar char=""/>
+              <a:defRPr sz="1400" b="0" i="0" kern="1200">
+                <a:solidFill>
+                  <a:schemeClr val="tx1"/>
+                </a:solidFill>
+                <a:latin typeface="+mj-lt"/>
+                <a:ea typeface="+mj-ea"/>
+                <a:cs typeface="+mj-cs"/>
+              </a:defRPr>
+            </a:lvl4pPr>
+            <a:lvl5pPr marL="2057400" indent="-228600" algn="l" defTabSz="457200" rtl="0" eaLnBrk="1" latinLnBrk="0" hangingPunct="1">
+              <a:spcBef>
+                <a:spcPts val="1000"/>
+              </a:spcBef>
+              <a:spcAft>
+                <a:spcPts val="0"/>
+              </a:spcAft>
+              <a:buClr>
+                <a:schemeClr val="accent1">
+                  <a:lumMod val="60000"/>
+                  <a:lumOff val="40000"/>
+                </a:schemeClr>
+              </a:buClr>
+              <a:buSzPct val="80000"/>
+              <a:buFont typeface="Wingdings 3" charset="2"/>
+              <a:buChar char=""/>
+              <a:defRPr sz="1400" b="0" i="0" kern="1200">
+                <a:solidFill>
+                  <a:schemeClr val="tx1"/>
+                </a:solidFill>
+                <a:latin typeface="+mj-lt"/>
+                <a:ea typeface="+mj-ea"/>
+                <a:cs typeface="+mj-cs"/>
+              </a:defRPr>
+            </a:lvl5pPr>
+            <a:lvl6pPr marL="2514600" indent="-228600" algn="l" defTabSz="457200" rtl="0" eaLnBrk="1" latinLnBrk="0" hangingPunct="1">
+              <a:spcBef>
+                <a:spcPts val="1000"/>
+              </a:spcBef>
+              <a:spcAft>
+                <a:spcPts val="0"/>
+              </a:spcAft>
+              <a:buClr>
+                <a:schemeClr val="accent1">
+                  <a:lumMod val="60000"/>
+                  <a:lumOff val="40000"/>
+                </a:schemeClr>
+              </a:buClr>
+              <a:buSzPct val="80000"/>
+              <a:buFont typeface="Wingdings 3" charset="2"/>
+              <a:buChar char=""/>
+              <a:defRPr sz="1400" b="0" i="0" kern="1200">
+                <a:solidFill>
+                  <a:schemeClr val="tx1"/>
+                </a:solidFill>
+                <a:latin typeface="+mj-lt"/>
+                <a:ea typeface="+mj-ea"/>
+                <a:cs typeface="+mj-cs"/>
+              </a:defRPr>
+            </a:lvl6pPr>
+            <a:lvl7pPr marL="2971800" indent="-228600" algn="l" defTabSz="457200" rtl="0" eaLnBrk="1" latinLnBrk="0" hangingPunct="1">
+              <a:spcBef>
+                <a:spcPts val="1000"/>
+              </a:spcBef>
+              <a:spcAft>
+                <a:spcPts val="0"/>
+              </a:spcAft>
+              <a:buClr>
+                <a:schemeClr val="accent1">
+                  <a:lumMod val="60000"/>
+                  <a:lumOff val="40000"/>
+                </a:schemeClr>
+              </a:buClr>
+              <a:buSzPct val="80000"/>
+              <a:buFont typeface="Wingdings 3" charset="2"/>
+              <a:buChar char=""/>
+              <a:defRPr sz="1400" b="0" i="0" kern="1200">
+                <a:solidFill>
+                  <a:schemeClr val="tx1"/>
+                </a:solidFill>
+                <a:latin typeface="+mj-lt"/>
+                <a:ea typeface="+mj-ea"/>
+                <a:cs typeface="+mj-cs"/>
+              </a:defRPr>
+            </a:lvl7pPr>
+            <a:lvl8pPr marL="3429000" indent="-228600" algn="l" defTabSz="457200" rtl="0" eaLnBrk="1" latinLnBrk="0" hangingPunct="1">
+              <a:spcBef>
+                <a:spcPts val="1000"/>
+              </a:spcBef>
+              <a:spcAft>
+                <a:spcPts val="0"/>
+              </a:spcAft>
+              <a:buClr>
+                <a:schemeClr val="accent1">
+                  <a:lumMod val="60000"/>
+                  <a:lumOff val="40000"/>
+                </a:schemeClr>
+              </a:buClr>
+              <a:buSzPct val="80000"/>
+              <a:buFont typeface="Wingdings 3" charset="2"/>
+              <a:buChar char=""/>
+              <a:defRPr sz="1400" b="0" i="0" kern="1200">
+                <a:solidFill>
+                  <a:schemeClr val="tx1"/>
+                </a:solidFill>
+                <a:latin typeface="+mj-lt"/>
+                <a:ea typeface="+mj-ea"/>
+                <a:cs typeface="+mj-cs"/>
+              </a:defRPr>
+            </a:lvl8pPr>
+            <a:lvl9pPr marL="3886200" indent="-228600" algn="l" defTabSz="457200" rtl="0" eaLnBrk="1" latinLnBrk="0" hangingPunct="1">
+              <a:spcBef>
+                <a:spcPts val="1000"/>
+              </a:spcBef>
+              <a:spcAft>
+                <a:spcPts val="0"/>
+              </a:spcAft>
+              <a:buClr>
+                <a:schemeClr val="accent1">
+                  <a:lumMod val="60000"/>
+                  <a:lumOff val="40000"/>
+                </a:schemeClr>
+              </a:buClr>
+              <a:buSzPct val="80000"/>
+              <a:buFont typeface="Wingdings 3" charset="2"/>
+              <a:buChar char=""/>
+              <a:defRPr sz="1400" b="0" i="0" kern="1200">
+                <a:solidFill>
+                  <a:schemeClr val="tx1"/>
+                </a:solidFill>
+                <a:latin typeface="+mj-lt"/>
+                <a:ea typeface="+mj-ea"/>
+                <a:cs typeface="+mj-cs"/>
+              </a:defRPr>
+            </a:lvl9pPr>
+          </a:lstStyle>
+          <a:p>
+            <a:r>
+              <a:rPr lang="en-US" dirty="0" smtClean="0"/>
+              <a:t>API: </a:t>
+            </a:r>
+          </a:p>
+          <a:p>
+            <a:pPr lvl="1"/>
+            <a:r>
+              <a:rPr lang="en-US" dirty="0" smtClean="0">
+                <a:hlinkClick r:id="rId2"/>
+              </a:rPr>
+              <a:t>http://www.squaremobius.net/amqp.node/channel_api.html</a:t>
+            </a:r>
+            <a:endParaRPr lang="en-US" dirty="0" smtClean="0"/>
+          </a:p>
+          <a:p>
+            <a:endParaRPr lang="en-US" sz="1900" dirty="0" smtClean="0"/>
+          </a:p>
+          <a:p>
+            <a:r>
+              <a:rPr lang="en-US" sz="1900" dirty="0" smtClean="0"/>
+              <a:t>Steps:</a:t>
+            </a:r>
+          </a:p>
+          <a:p>
+            <a:pPr marL="457200" lvl="1" indent="0">
+              <a:buFont typeface="Wingdings 3" charset="2"/>
+              <a:buNone/>
+            </a:pPr>
+            <a:r>
+              <a:rPr lang="en-US" sz="1900" dirty="0" smtClean="0"/>
+              <a:t>1. Open connection to </a:t>
+            </a:r>
+            <a:r>
+              <a:rPr lang="en-US" sz="1900" dirty="0" err="1" smtClean="0"/>
+              <a:t>RabbitMQ</a:t>
+            </a:r>
+            <a:endParaRPr lang="en-US" sz="1900" dirty="0" smtClean="0"/>
+          </a:p>
+          <a:p>
+            <a:pPr marL="457200" lvl="1" indent="0">
+              <a:buFont typeface="Wingdings 3" charset="2"/>
+              <a:buNone/>
+            </a:pPr>
+            <a:r>
+              <a:rPr lang="en-US" sz="1900" dirty="0" smtClean="0"/>
+              <a:t>2. Create Channel </a:t>
+            </a:r>
+          </a:p>
+          <a:p>
+            <a:pPr lvl="2"/>
+            <a:r>
+              <a:rPr lang="en-US" sz="1900" dirty="0" smtClean="0"/>
+              <a:t>Create Exchange</a:t>
+            </a:r>
+          </a:p>
+          <a:p>
+            <a:pPr marL="457200" lvl="1" indent="0">
+              <a:buFont typeface="Wingdings 3" charset="2"/>
+              <a:buNone/>
+            </a:pPr>
+            <a:r>
+              <a:rPr lang="en-US" sz="1900" dirty="0" smtClean="0"/>
+              <a:t>3. Create Consumer Channel</a:t>
+            </a:r>
+          </a:p>
+          <a:p>
+            <a:pPr lvl="2"/>
+            <a:r>
+              <a:rPr lang="en-US" sz="1900" dirty="0" smtClean="0"/>
+              <a:t>Create Queue</a:t>
+            </a:r>
+          </a:p>
+          <a:p>
+            <a:pPr lvl="2"/>
+            <a:r>
+              <a:rPr lang="en-US" sz="1900" dirty="0" smtClean="0"/>
+              <a:t>Bind queue</a:t>
+            </a:r>
+          </a:p>
+          <a:p>
+            <a:pPr lvl="2"/>
+            <a:r>
+              <a:rPr lang="en-US" sz="1900" dirty="0" err="1" smtClean="0"/>
+              <a:t>cosume</a:t>
+            </a:r>
+            <a:endParaRPr lang="en-US" sz="1900" dirty="0" smtClean="0"/>
+          </a:p>
+          <a:p>
+            <a:pPr marL="457200" lvl="1" indent="0">
+              <a:buFont typeface="Wingdings 3" charset="2"/>
+              <a:buNone/>
+            </a:pPr>
+            <a:r>
+              <a:rPr lang="en-US" sz="1900" dirty="0" smtClean="0"/>
+              <a:t>4. Create Producer Channel</a:t>
+            </a:r>
+          </a:p>
+          <a:p>
+            <a:pPr lvl="2"/>
+            <a:r>
+              <a:rPr lang="en-US" sz="1900" dirty="0" smtClean="0"/>
+              <a:t>Send Message</a:t>
+            </a:r>
+            <a:endParaRPr lang="en-US" sz="1900" dirty="0"/>
           </a:p>
         </p:txBody>
       </p:sp>
@@ -14087,85 +14548,6 @@
           <a:p>
             <a:r>
               <a:rPr lang="en-US" dirty="0" smtClean="0"/>
-              <a:t>Coding Example 3</a:t>
-            </a:r>
-            <a:endParaRPr lang="en-US" dirty="0"/>
-          </a:p>
-        </p:txBody>
-      </p:sp>
-      <p:sp>
-        <p:nvSpPr>
-          <p:cNvPr id="3" name="Content Placeholder 2"/>
-          <p:cNvSpPr>
-            <a:spLocks noGrp="1"/>
-          </p:cNvSpPr>
-          <p:nvPr>
-            <p:ph idx="1"/>
-          </p:nvPr>
-        </p:nvSpPr>
-        <p:spPr/>
-        <p:txBody>
-          <a:bodyPr/>
-          <a:lstStyle/>
-          <a:p>
-            <a:endParaRPr lang="en-US"/>
-          </a:p>
-        </p:txBody>
-      </p:sp>
-    </p:spTree>
-    <p:extLst>
-      <p:ext uri="{BB962C8B-B14F-4D97-AF65-F5344CB8AC3E}">
-        <p14:creationId xmlns:p14="http://schemas.microsoft.com/office/powerpoint/2010/main" val="2069127843"/>
-      </p:ext>
-    </p:extLst>
-  </p:cSld>
-  <p:clrMapOvr>
-    <a:masterClrMapping/>
-  </p:clrMapOvr>
-  <p:timing>
-    <p:tnLst>
-      <p:par>
-        <p:cTn id="1" dur="indefinite" restart="never" nodeType="tmRoot"/>
-      </p:par>
-    </p:tnLst>
-  </p:timing>
-</p:sld>
-</file>
-
-<file path=ppt/slides/slide41.xml><?xml version="1.0" encoding="utf-8"?>
-<p:sld xmlns:a="http://schemas.openxmlformats.org/drawingml/2006/main" xmlns:r="http://schemas.openxmlformats.org/officeDocument/2006/relationships" xmlns:p="http://schemas.openxmlformats.org/presentationml/2006/main">
-  <p:cSld>
-    <p:spTree>
-      <p:nvGrpSpPr>
-        <p:cNvPr id="1" name=""/>
-        <p:cNvGrpSpPr/>
-        <p:nvPr/>
-      </p:nvGrpSpPr>
-      <p:grpSpPr>
-        <a:xfrm>
-          <a:off x="0" y="0"/>
-          <a:ext cx="0" cy="0"/>
-          <a:chOff x="0" y="0"/>
-          <a:chExt cx="0" cy="0"/>
-        </a:xfrm>
-      </p:grpSpPr>
-      <p:sp>
-        <p:nvSpPr>
-          <p:cNvPr id="2" name="Title 1"/>
-          <p:cNvSpPr>
-            <a:spLocks noGrp="1"/>
-          </p:cNvSpPr>
-          <p:nvPr>
-            <p:ph type="title"/>
-          </p:nvPr>
-        </p:nvSpPr>
-        <p:spPr/>
-        <p:txBody>
-          <a:bodyPr/>
-          <a:lstStyle/>
-          <a:p>
-            <a:r>
-              <a:rPr lang="en-US" dirty="0" smtClean="0"/>
               <a:t>Configuring </a:t>
             </a:r>
             <a:r>
@@ -14202,15 +14584,7 @@
             </a:r>
             <a:r>
               <a:rPr lang="en-US" dirty="0" smtClean="0"/>
-              <a:t> – </a:t>
-            </a:r>
-            <a:r>
-              <a:rPr lang="en-US" dirty="0" smtClean="0"/>
-              <a:t>container for </a:t>
-            </a:r>
-            <a:r>
-              <a:rPr lang="en-US" dirty="0" smtClean="0"/>
-              <a:t>exchanges and queues</a:t>
+              <a:t> – container for exchanges and queues</a:t>
             </a:r>
           </a:p>
           <a:p>
@@ -14265,11 +14639,7 @@
             </a:r>
             <a:r>
               <a:rPr lang="en-US" dirty="0" smtClean="0"/>
-              <a:t> messages </a:t>
-            </a:r>
-            <a:r>
-              <a:rPr lang="en-US" dirty="0" smtClean="0"/>
-              <a:t>consumer can take at once</a:t>
+              <a:t> messages consumer can take at once</a:t>
             </a:r>
           </a:p>
           <a:p>
@@ -14282,11 +14652,7 @@
             <a:pPr lvl="1"/>
             <a:r>
               <a:rPr lang="en-US" dirty="0" smtClean="0"/>
-              <a:t>Connections take up a TCP/IP </a:t>
-            </a:r>
-            <a:r>
-              <a:rPr lang="en-US" dirty="0" smtClean="0"/>
-              <a:t>port</a:t>
+              <a:t>Connections take up a TCP/IP port</a:t>
             </a:r>
           </a:p>
           <a:p>
@@ -14295,7 +14661,6 @@
               <a:rPr lang="en-US" dirty="0" smtClean="0"/>
               <a:t>Don’t open and close channels / connections repeatedly</a:t>
             </a:r>
-            <a:endParaRPr lang="en-US" dirty="0" smtClean="0"/>
           </a:p>
           <a:p>
             <a:r>
@@ -15514,13 +15879,8 @@
                       </a:r>
                       <a:r>
                         <a:rPr lang="en-US" dirty="0" smtClean="0"/>
-                        <a:t> = </a:t>
+                        <a:t> = ‘order’</a:t>
                       </a:r>
-                      <a:r>
-                        <a:rPr lang="en-US" dirty="0" smtClean="0"/>
-                        <a:t>‘order’</a:t>
-                      </a:r>
-                      <a:endParaRPr lang="en-US" dirty="0" smtClean="0"/>
                     </a:p>
                   </a:txBody>
                   <a:tcPr anchor="ctr"/>
@@ -15585,11 +15945,7 @@
                       </a:r>
                       <a:r>
                         <a:rPr lang="en-US" baseline="0" dirty="0" smtClean="0"/>
-                        <a:t> = </a:t>
-                      </a:r>
-                      <a:r>
-                        <a:rPr lang="en-US" baseline="0" dirty="0" smtClean="0"/>
-                        <a:t>‘order’</a:t>
+                        <a:t> = ‘order’</a:t>
                       </a:r>
                       <a:endParaRPr lang="en-US" dirty="0" smtClean="0"/>
                     </a:p>

</xml_diff>